<commit_message>
Lab 2 and week 6
</commit_message>
<xml_diff>
--- a/Slides/Geog4300 Fa17 Lecture 6-1 Describing spatial data.pptx
+++ b/Slides/Geog4300 Fa17 Lecture 6-1 Describing spatial data.pptx
@@ -241,6 +241,11 @@
       </a:defRPr>
     </a:lvl9pPr>
   </p:defaultTextStyle>
+  <p:extLst>
+    <p:ext uri="{EFAFB233-063F-42B5-8137-9DF3F51BA10A}">
+      <p15:sldGuideLst xmlns:p15="http://schemas.microsoft.com/office/powerpoint/2012/main"/>
+    </p:ext>
+  </p:extLst>
 </p:presentation>
 </file>
 
@@ -16387,9 +16392,7 @@
                 <a:solidFill>
                   <a:srgbClr val="FFFF66"/>
                 </a:solidFill>
-                <a:latin typeface="Calibri"/>
-                <a:ea typeface="Calibri"/>
-                <a:cs typeface="Calibri"/>
+                <a:latin typeface="Gill Sans MT" panose="020B0502020104020203" pitchFamily="34" charset="0"/>
                 <a:sym typeface="Calibri"/>
               </a:rPr>
               <a:t>Describing spatial </a:t>
@@ -16399,9 +16402,7 @@
                 <a:solidFill>
                   <a:srgbClr val="FFFF66"/>
                 </a:solidFill>
-                <a:latin typeface="Calibri"/>
-                <a:ea typeface="Calibri"/>
-                <a:cs typeface="Calibri"/>
+                <a:latin typeface="Gill Sans MT" panose="020B0502020104020203" pitchFamily="34" charset="0"/>
                 <a:sym typeface="Calibri"/>
               </a:rPr>
               <a:t>data</a:t>
@@ -16456,11 +16457,11 @@
               <a:buNone/>
             </a:pPr>
             <a:r>
-              <a:rPr lang="en-US" sz="2750" b="0" i="0" u="none" strike="noStrike" cap="none">
+              <a:rPr lang="en-US" sz="2750" b="0" i="0" u="none" strike="noStrike" cap="none" dirty="0">
                 <a:solidFill>
                   <a:srgbClr val="FFFF66"/>
                 </a:solidFill>
-                <a:latin typeface="Calibri"/>
+                <a:latin typeface="Gill Sans MT" panose="020B0502020104020203" pitchFamily="34" charset="0"/>
                 <a:ea typeface="Calibri"/>
                 <a:cs typeface="Calibri"/>
                 <a:sym typeface="Calibri"/>
@@ -16484,11 +16485,11 @@
               <a:buNone/>
             </a:pPr>
             <a:r>
-              <a:rPr lang="en-US" sz="2750" b="0" i="0" u="none" strike="noStrike" cap="none">
+              <a:rPr lang="en-US" sz="2750" b="0" i="0" u="none" strike="noStrike" cap="none" dirty="0">
                 <a:solidFill>
                   <a:srgbClr val="FFFF66"/>
                 </a:solidFill>
-                <a:latin typeface="Calibri"/>
+                <a:latin typeface="Gill Sans MT" panose="020B0502020104020203" pitchFamily="34" charset="0"/>
                 <a:ea typeface="Calibri"/>
                 <a:cs typeface="Calibri"/>
                 <a:sym typeface="Calibri"/>
@@ -17474,15 +17475,6 @@
               </a:rPr>
               <a:t>0.788</a:t>
             </a:r>
-            <a:endParaRPr lang="en-US" sz="3200" b="1" i="1" dirty="0">
-              <a:solidFill>
-                <a:srgbClr val="FFFF66"/>
-              </a:solidFill>
-              <a:latin typeface="Calibri"/>
-              <a:ea typeface="Calibri"/>
-              <a:cs typeface="Calibri"/>
-              <a:sym typeface="Calibri"/>
-            </a:endParaRPr>
           </a:p>
         </p:txBody>
       </p:sp>
@@ -24664,11 +24656,11 @@
               <a:buNone/>
             </a:pPr>
             <a:r>
-              <a:rPr lang="en-US" sz="3600" b="0" i="0" u="none" strike="noStrike" cap="none">
+              <a:rPr lang="en-US" sz="3600" b="0" i="0" u="none" strike="noStrike" cap="none" dirty="0">
                 <a:solidFill>
                   <a:srgbClr val="FFFF66"/>
                 </a:solidFill>
-                <a:latin typeface="Calibri"/>
+                <a:latin typeface="Gill Sans MT" panose="020B0502020104020203" pitchFamily="34" charset="0"/>
                 <a:ea typeface="Calibri"/>
                 <a:cs typeface="Calibri"/>
                 <a:sym typeface="Calibri"/>
@@ -24715,11 +24707,11 @@
               <a:buChar char="•"/>
             </a:pPr>
             <a:r>
-              <a:rPr lang="en-US" sz="2800">
+              <a:rPr lang="en-US" sz="2800" dirty="0">
                 <a:solidFill>
                   <a:srgbClr val="FFFF66"/>
                 </a:solidFill>
-                <a:latin typeface="Calibri"/>
+                <a:latin typeface="Gill Sans MT" panose="020B0502020104020203" pitchFamily="34" charset="0"/>
                 <a:ea typeface="Calibri"/>
                 <a:cs typeface="Calibri"/>
                 <a:sym typeface="Calibri"/>
@@ -24727,11 +24719,11 @@
               <a:t>Frequency distributions describe the attribute characteristics (the </a:t>
             </a:r>
             <a:r>
-              <a:rPr lang="en-US" sz="2800" i="1">
+              <a:rPr lang="en-US" sz="2800" i="1" dirty="0">
                 <a:solidFill>
                   <a:srgbClr val="FFFF66"/>
                 </a:solidFill>
-                <a:latin typeface="Calibri"/>
+                <a:latin typeface="Gill Sans MT" panose="020B0502020104020203" pitchFamily="34" charset="0"/>
                 <a:ea typeface="Calibri"/>
                 <a:cs typeface="Calibri"/>
                 <a:sym typeface="Calibri"/>
@@ -24739,11 +24731,11 @@
               <a:t>what</a:t>
             </a:r>
             <a:r>
-              <a:rPr lang="en-US" sz="2800">
+              <a:rPr lang="en-US" sz="2800" dirty="0">
                 <a:solidFill>
                   <a:srgbClr val="FFFF66"/>
                 </a:solidFill>
-                <a:latin typeface="Calibri"/>
+                <a:latin typeface="Gill Sans MT" panose="020B0502020104020203" pitchFamily="34" charset="0"/>
                 <a:ea typeface="Calibri"/>
                 <a:cs typeface="Calibri"/>
                 <a:sym typeface="Calibri"/>
@@ -24751,11 +24743,11 @@
               <a:t> or </a:t>
             </a:r>
             <a:r>
-              <a:rPr lang="en-US" sz="2800" i="1">
+              <a:rPr lang="en-US" sz="2800" i="1" dirty="0">
                 <a:solidFill>
                   <a:srgbClr val="FFFF66"/>
                 </a:solidFill>
-                <a:latin typeface="Calibri"/>
+                <a:latin typeface="Gill Sans MT" panose="020B0502020104020203" pitchFamily="34" charset="0"/>
                 <a:ea typeface="Calibri"/>
                 <a:cs typeface="Calibri"/>
                 <a:sym typeface="Calibri"/>
@@ -24763,11 +24755,11 @@
               <a:t>how much</a:t>
             </a:r>
             <a:r>
-              <a:rPr lang="en-US" sz="2800">
+              <a:rPr lang="en-US" sz="2800" dirty="0">
                 <a:solidFill>
                   <a:srgbClr val="FFFF66"/>
                 </a:solidFill>
-                <a:latin typeface="Calibri"/>
+                <a:latin typeface="Gill Sans MT" panose="020B0502020104020203" pitchFamily="34" charset="0"/>
                 <a:ea typeface="Calibri"/>
                 <a:cs typeface="Calibri"/>
                 <a:sym typeface="Calibri"/>
@@ -24788,11 +24780,11 @@
               <a:buChar char="•"/>
             </a:pPr>
             <a:r>
-              <a:rPr lang="en-US" sz="2800">
+              <a:rPr lang="en-US" sz="2800" dirty="0">
                 <a:solidFill>
                   <a:srgbClr val="FFFF66"/>
                 </a:solidFill>
-                <a:latin typeface="Calibri"/>
+                <a:latin typeface="Gill Sans MT" panose="020B0502020104020203" pitchFamily="34" charset="0"/>
                 <a:ea typeface="Calibri"/>
                 <a:cs typeface="Calibri"/>
                 <a:sym typeface="Calibri"/>
@@ -24800,11 +24792,11 @@
               <a:t>Spatial distributions describe the locational characteristics (the </a:t>
             </a:r>
             <a:r>
-              <a:rPr lang="en-US" sz="2800" i="1">
+              <a:rPr lang="en-US" sz="2800" i="1" dirty="0">
                 <a:solidFill>
                   <a:srgbClr val="FFFF66"/>
                 </a:solidFill>
-                <a:latin typeface="Calibri"/>
+                <a:latin typeface="Gill Sans MT" panose="020B0502020104020203" pitchFamily="34" charset="0"/>
                 <a:ea typeface="Calibri"/>
                 <a:cs typeface="Calibri"/>
                 <a:sym typeface="Calibri"/>
@@ -24812,11 +24804,11 @@
               <a:t>where</a:t>
             </a:r>
             <a:r>
-              <a:rPr lang="en-US" sz="2800">
+              <a:rPr lang="en-US" sz="2800" dirty="0">
                 <a:solidFill>
                   <a:srgbClr val="FFFF66"/>
                 </a:solidFill>
-                <a:latin typeface="Calibri"/>
+                <a:latin typeface="Gill Sans MT" panose="020B0502020104020203" pitchFamily="34" charset="0"/>
                 <a:ea typeface="Calibri"/>
                 <a:cs typeface="Calibri"/>
                 <a:sym typeface="Calibri"/>
@@ -25636,8 +25628,8 @@
           </a:p>
         </p:txBody>
       </p:sp>
-      <mc:AlternateContent xmlns:mc="http://schemas.openxmlformats.org/markup-compatibility/2006">
-        <mc:Choice xmlns:a14="http://schemas.microsoft.com/office/drawing/2010/main" Requires="a14">
+      <mc:AlternateContent xmlns:mc="http://schemas.openxmlformats.org/markup-compatibility/2006" xmlns:a14="http://schemas.microsoft.com/office/drawing/2010/main">
+        <mc:Choice Requires="a14">
           <p:sp>
             <p:nvSpPr>
               <p:cNvPr id="10" name="TextBox 9"/>
@@ -25660,6 +25652,7 @@
               </a:bodyPr>
               <a:lstStyle/>
               <a:p>
+                <a:pPr/>
                 <a14:m>
                   <m:oMathPara xmlns:m="http://schemas.openxmlformats.org/officeDocument/2006/math">
                     <m:oMathParaPr>
@@ -25759,7 +25752,7 @@
             </p:txBody>
           </p:sp>
         </mc:Choice>
-        <mc:Fallback>
+        <mc:Fallback xmlns="">
           <p:sp>
             <p:nvSpPr>
               <p:cNvPr id="10" name="TextBox 9"/>
@@ -25798,8 +25791,8 @@
           </p:sp>
         </mc:Fallback>
       </mc:AlternateContent>
-      <mc:AlternateContent xmlns:mc="http://schemas.openxmlformats.org/markup-compatibility/2006">
-        <mc:Choice xmlns:a14="http://schemas.microsoft.com/office/drawing/2010/main" Requires="a14">
+      <mc:AlternateContent xmlns:mc="http://schemas.openxmlformats.org/markup-compatibility/2006" xmlns:a14="http://schemas.microsoft.com/office/drawing/2010/main">
+        <mc:Choice Requires="a14">
           <p:sp>
             <p:nvSpPr>
               <p:cNvPr id="24" name="TextBox 23"/>
@@ -25822,6 +25815,7 @@
               </a:bodyPr>
               <a:lstStyle/>
               <a:p>
+                <a:pPr/>
                 <a14:m>
                   <m:oMathPara xmlns:m="http://schemas.openxmlformats.org/officeDocument/2006/math">
                     <m:oMathParaPr>
@@ -25921,7 +25915,7 @@
             </p:txBody>
           </p:sp>
         </mc:Choice>
-        <mc:Fallback>
+        <mc:Fallback xmlns="">
           <p:sp>
             <p:nvSpPr>
               <p:cNvPr id="24" name="TextBox 23"/>
@@ -26748,8 +26742,8 @@
           </a:p>
         </p:txBody>
       </p:sp>
-      <mc:AlternateContent xmlns:mc="http://schemas.openxmlformats.org/markup-compatibility/2006">
-        <mc:Choice xmlns:a14="http://schemas.microsoft.com/office/drawing/2010/main" Requires="a14">
+      <mc:AlternateContent xmlns:mc="http://schemas.openxmlformats.org/markup-compatibility/2006" xmlns:a14="http://schemas.microsoft.com/office/drawing/2010/main">
+        <mc:Choice Requires="a14">
           <p:sp>
             <p:nvSpPr>
               <p:cNvPr id="10" name="TextBox 9"/>
@@ -26772,6 +26766,7 @@
               </a:bodyPr>
               <a:lstStyle/>
               <a:p>
+                <a:pPr/>
                 <a14:m>
                   <m:oMathPara xmlns:m="http://schemas.openxmlformats.org/officeDocument/2006/math">
                     <m:oMathParaPr>
@@ -26834,7 +26829,7 @@
             </p:txBody>
           </p:sp>
         </mc:Choice>
-        <mc:Fallback>
+        <mc:Fallback xmlns="">
           <p:sp>
             <p:nvSpPr>
               <p:cNvPr id="10" name="TextBox 9"/>
@@ -26873,8 +26868,8 @@
           </p:sp>
         </mc:Fallback>
       </mc:AlternateContent>
-      <mc:AlternateContent xmlns:mc="http://schemas.openxmlformats.org/markup-compatibility/2006">
-        <mc:Choice xmlns:a14="http://schemas.microsoft.com/office/drawing/2010/main" Requires="a14">
+      <mc:AlternateContent xmlns:mc="http://schemas.openxmlformats.org/markup-compatibility/2006" xmlns:a14="http://schemas.microsoft.com/office/drawing/2010/main">
+        <mc:Choice Requires="a14">
           <p:sp>
             <p:nvSpPr>
               <p:cNvPr id="24" name="TextBox 23"/>
@@ -26897,6 +26892,7 @@
               </a:bodyPr>
               <a:lstStyle/>
               <a:p>
+                <a:pPr/>
                 <a14:m>
                   <m:oMathPara xmlns:m="http://schemas.openxmlformats.org/officeDocument/2006/math">
                     <m:oMathParaPr>
@@ -26959,7 +26955,7 @@
             </p:txBody>
           </p:sp>
         </mc:Choice>
-        <mc:Fallback>
+        <mc:Fallback xmlns="">
           <p:sp>
             <p:nvSpPr>
               <p:cNvPr id="24" name="TextBox 23"/>
@@ -28645,15 +28641,6 @@
               </a:rPr>
               <a:t>Used to calculate “activity spaces” and other spatial distributions</a:t>
             </a:r>
-            <a:endParaRPr lang="en-US" sz="3600" dirty="0">
-              <a:solidFill>
-                <a:srgbClr val="FFFF66"/>
-              </a:solidFill>
-              <a:latin typeface="Calibri"/>
-              <a:ea typeface="Calibri"/>
-              <a:cs typeface="Calibri"/>
-              <a:sym typeface="Calibri"/>
-            </a:endParaRPr>
           </a:p>
         </p:txBody>
       </p:sp>
@@ -28979,7 +28966,7 @@
                 <a:solidFill>
                   <a:srgbClr val="FFFF66"/>
                 </a:solidFill>
-                <a:latin typeface="Calibri"/>
+                <a:latin typeface="Gill Sans MT" panose="020B0502020104020203" pitchFamily="34" charset="0"/>
                 <a:ea typeface="Calibri"/>
                 <a:cs typeface="Calibri"/>
                 <a:sym typeface="Calibri"/>
@@ -29026,7 +29013,7 @@
                 <a:solidFill>
                   <a:srgbClr val="FFFF66"/>
                 </a:solidFill>
-                <a:latin typeface="Calibri"/>
+                <a:latin typeface="Gill Sans MT" panose="020B0502020104020203" pitchFamily="34" charset="0"/>
                 <a:ea typeface="Calibri"/>
                 <a:cs typeface="Calibri"/>
                 <a:sym typeface="Calibri"/>
@@ -29121,14 +29108,14 @@
               <a:buNone/>
             </a:pPr>
             <a:r>
-              <a:rPr lang="en-US" sz="3200">
+              <a:rPr lang="en-US" sz="3200" b="1" dirty="0">
                 <a:solidFill>
                   <a:srgbClr val="FFFF66"/>
                 </a:solidFill>
-                <a:latin typeface="Cabin"/>
-                <a:ea typeface="Cabin"/>
-                <a:cs typeface="Cabin"/>
-                <a:sym typeface="Cabin"/>
+                <a:latin typeface="Gill Sans MT"/>
+                <a:ea typeface="Gill Sans MT"/>
+                <a:cs typeface="Gill Sans MT"/>
+                <a:sym typeface="Gill Sans MT"/>
               </a:rPr>
               <a:t>Nearest neighbor index (NNI)</a:t>
             </a:r>
@@ -29142,14 +29129,14 @@
               <a:buNone/>
             </a:pPr>
             <a:r>
-              <a:rPr lang="en-US" sz="3200">
+              <a:rPr lang="en-US" sz="3200" b="1" dirty="0">
                 <a:solidFill>
                   <a:srgbClr val="FFFF66"/>
                 </a:solidFill>
-                <a:latin typeface="Cabin"/>
-                <a:ea typeface="Cabin"/>
-                <a:cs typeface="Cabin"/>
-                <a:sym typeface="Cabin"/>
+                <a:latin typeface="Gill Sans MT"/>
+                <a:ea typeface="Gill Sans MT"/>
+                <a:cs typeface="Gill Sans MT"/>
+                <a:sym typeface="Gill Sans MT"/>
               </a:rPr>
               <a:t>	</a:t>
             </a:r>
@@ -29274,10 +29261,10 @@
                 <a:solidFill>
                   <a:srgbClr val="FFFF66"/>
                 </a:solidFill>
-                <a:latin typeface="Cabin"/>
-                <a:ea typeface="Cabin"/>
-                <a:cs typeface="Cabin"/>
-                <a:sym typeface="Cabin"/>
+                <a:latin typeface="Gill Sans MT"/>
+                <a:ea typeface="Gill Sans MT"/>
+                <a:cs typeface="Gill Sans MT"/>
+                <a:sym typeface="Gill Sans MT"/>
               </a:rPr>
               <a:t>How does the average distance to the nearest </a:t>
             </a:r>
@@ -29286,10 +29273,10 @@
                 <a:solidFill>
                   <a:srgbClr val="FFFF66"/>
                 </a:solidFill>
-                <a:latin typeface="Cabin"/>
-                <a:ea typeface="Cabin"/>
-                <a:cs typeface="Cabin"/>
-                <a:sym typeface="Cabin"/>
+                <a:latin typeface="Gill Sans MT"/>
+                <a:ea typeface="Gill Sans MT"/>
+                <a:cs typeface="Gill Sans MT"/>
+                <a:sym typeface="Gill Sans MT"/>
               </a:rPr>
             </a:br>
             <a:r>
@@ -29297,10 +29284,10 @@
                 <a:solidFill>
                   <a:srgbClr val="FFFF66"/>
                 </a:solidFill>
-                <a:latin typeface="Cabin"/>
-                <a:ea typeface="Cabin"/>
-                <a:cs typeface="Cabin"/>
-                <a:sym typeface="Cabin"/>
+                <a:latin typeface="Gill Sans MT"/>
+                <a:ea typeface="Gill Sans MT"/>
+                <a:cs typeface="Gill Sans MT"/>
+                <a:sym typeface="Gill Sans MT"/>
               </a:rPr>
               <a:t>neighbor compare to the distance we would expect with a random distribution? </a:t>
             </a:r>
@@ -29344,10 +29331,10 @@
                 <a:solidFill>
                   <a:schemeClr val="dk1"/>
                 </a:solidFill>
-                <a:latin typeface="Cabin"/>
-                <a:ea typeface="Cabin"/>
-                <a:cs typeface="Cabin"/>
-                <a:sym typeface="Cabin"/>
+                <a:latin typeface="Gill Sans MT"/>
+                <a:ea typeface="Gill Sans MT"/>
+                <a:cs typeface="Gill Sans MT"/>
+                <a:sym typeface="Gill Sans MT"/>
               </a:rPr>
               <a:t>R</a:t>
             </a:r>
@@ -29391,10 +29378,10 @@
                 <a:solidFill>
                   <a:srgbClr val="FFFF66"/>
                 </a:solidFill>
-                <a:latin typeface="Cabin"/>
-                <a:ea typeface="Cabin"/>
-                <a:cs typeface="Cabin"/>
-                <a:sym typeface="Cabin"/>
+                <a:latin typeface="Gill Sans MT"/>
+                <a:ea typeface="Gill Sans MT"/>
+                <a:cs typeface="Gill Sans MT"/>
+                <a:sym typeface="Gill Sans MT"/>
               </a:rPr>
               <a:t>Random</a:t>
             </a:r>
@@ -29438,10 +29425,10 @@
                 <a:solidFill>
                   <a:srgbClr val="FFFF66"/>
                 </a:solidFill>
-                <a:latin typeface="Cabin"/>
-                <a:ea typeface="Cabin"/>
-                <a:cs typeface="Cabin"/>
-                <a:sym typeface="Cabin"/>
+                <a:latin typeface="Gill Sans MT"/>
+                <a:ea typeface="Gill Sans MT"/>
+                <a:cs typeface="Gill Sans MT"/>
+                <a:sym typeface="Gill Sans MT"/>
               </a:rPr>
               <a:t>Dispersed</a:t>
             </a:r>
@@ -29485,10 +29472,10 @@
                 <a:solidFill>
                   <a:srgbClr val="FFFF66"/>
                 </a:solidFill>
-                <a:latin typeface="Cabin"/>
-                <a:ea typeface="Cabin"/>
-                <a:cs typeface="Cabin"/>
-                <a:sym typeface="Cabin"/>
+                <a:latin typeface="Gill Sans MT"/>
+                <a:ea typeface="Gill Sans MT"/>
+                <a:cs typeface="Gill Sans MT"/>
+                <a:sym typeface="Gill Sans MT"/>
               </a:rPr>
               <a:t>Clustered</a:t>
             </a:r>
@@ -29562,10 +29549,10 @@
                 <a:solidFill>
                   <a:srgbClr val="FFFF66"/>
                 </a:solidFill>
-                <a:latin typeface="Cabin"/>
-                <a:ea typeface="Cabin"/>
-                <a:cs typeface="Cabin"/>
-                <a:sym typeface="Cabin"/>
+                <a:latin typeface="Gill Sans MT"/>
+                <a:ea typeface="Gill Sans MT"/>
+                <a:cs typeface="Gill Sans MT"/>
+                <a:sym typeface="Gill Sans MT"/>
               </a:rPr>
               <a:t>Nearest Neighbor Index (NNI)</a:t>
             </a:r>
@@ -29743,10 +29730,10 @@
                 <a:solidFill>
                   <a:srgbClr val="FFFF66"/>
                 </a:solidFill>
-                <a:latin typeface="Cabin"/>
-                <a:ea typeface="Cabin"/>
-                <a:cs typeface="Cabin"/>
-                <a:sym typeface="Cabin"/>
+                <a:latin typeface="Gill Sans MT"/>
+                <a:ea typeface="Gill Sans MT"/>
+                <a:cs typeface="Gill Sans MT"/>
+                <a:sym typeface="Gill Sans MT"/>
               </a:rPr>
               <a:t>Average NN distance</a:t>
             </a:r>
@@ -29816,10 +29803,10 @@
                 <a:solidFill>
                   <a:srgbClr val="FFFF66"/>
                 </a:solidFill>
-                <a:latin typeface="Cabin"/>
-                <a:ea typeface="Cabin"/>
-                <a:cs typeface="Cabin"/>
-                <a:sym typeface="Cabin"/>
+                <a:latin typeface="Gill Sans MT"/>
+                <a:ea typeface="Gill Sans MT"/>
+                <a:cs typeface="Gill Sans MT"/>
+                <a:sym typeface="Gill Sans MT"/>
               </a:rPr>
               <a:t>Average NN distance for random points</a:t>
             </a:r>
@@ -29889,10 +29876,10 @@
                 <a:solidFill>
                   <a:srgbClr val="FFFF66"/>
                 </a:solidFill>
-                <a:latin typeface="Cabin"/>
-                <a:ea typeface="Cabin"/>
-                <a:cs typeface="Cabin"/>
-                <a:sym typeface="Cabin"/>
+                <a:latin typeface="Gill Sans MT"/>
+                <a:ea typeface="Gill Sans MT"/>
+                <a:cs typeface="Gill Sans MT"/>
+                <a:sym typeface="Gill Sans MT"/>
               </a:rPr>
               <a:t>Sum of distances to NN/# of points</a:t>
             </a:r>
@@ -29962,10 +29949,10 @@
                 <a:solidFill>
                   <a:srgbClr val="FFFF66"/>
                 </a:solidFill>
-                <a:latin typeface="Cabin"/>
-                <a:ea typeface="Cabin"/>
-                <a:cs typeface="Cabin"/>
-                <a:sym typeface="Cabin"/>
+                <a:latin typeface="Gill Sans MT"/>
+                <a:ea typeface="Gill Sans MT"/>
+                <a:cs typeface="Gill Sans MT"/>
+                <a:sym typeface="Gill Sans MT"/>
               </a:rPr>
               <a:t>Total study area divided by # of points</a:t>
             </a:r>
@@ -30013,10 +30000,10 @@
             </a:pPr>
             <a:r>
               <a:rPr lang="en-US" sz="1800">
-                <a:latin typeface="Cabin"/>
-                <a:ea typeface="Cabin"/>
-                <a:cs typeface="Cabin"/>
-                <a:sym typeface="Cabin"/>
+                <a:latin typeface="Gill Sans MT"/>
+                <a:ea typeface="Gill Sans MT"/>
+                <a:cs typeface="Gill Sans MT"/>
+                <a:sym typeface="Gill Sans MT"/>
               </a:rPr>
               <a:t> </a:t>
             </a:r>
@@ -30064,10 +30051,10 @@
             </a:pPr>
             <a:r>
               <a:rPr lang="en-US" sz="1800">
-                <a:latin typeface="Cabin"/>
-                <a:ea typeface="Cabin"/>
-                <a:cs typeface="Cabin"/>
-                <a:sym typeface="Cabin"/>
+                <a:latin typeface="Gill Sans MT"/>
+                <a:ea typeface="Gill Sans MT"/>
+                <a:cs typeface="Gill Sans MT"/>
+                <a:sym typeface="Gill Sans MT"/>
               </a:rPr>
               <a:t> </a:t>
             </a:r>
@@ -30141,10 +30128,10 @@
                 <a:solidFill>
                   <a:srgbClr val="FFFF66"/>
                 </a:solidFill>
-                <a:latin typeface="Cabin"/>
-                <a:ea typeface="Cabin"/>
-                <a:cs typeface="Cabin"/>
-                <a:sym typeface="Cabin"/>
+                <a:latin typeface="Gill Sans MT"/>
+                <a:ea typeface="Gill Sans MT"/>
+                <a:cs typeface="Gill Sans MT"/>
+                <a:sym typeface="Gill Sans MT"/>
               </a:rPr>
               <a:t>Nearest neighbor index (NNI)</a:t>
             </a:r>
@@ -30162,10 +30149,10 @@
                 <a:solidFill>
                   <a:srgbClr val="FFFF66"/>
                 </a:solidFill>
-                <a:latin typeface="Cabin"/>
-                <a:ea typeface="Cabin"/>
-                <a:cs typeface="Cabin"/>
-                <a:sym typeface="Cabin"/>
+                <a:latin typeface="Gill Sans MT"/>
+                <a:ea typeface="Gill Sans MT"/>
+                <a:cs typeface="Gill Sans MT"/>
+                <a:sym typeface="Gill Sans MT"/>
               </a:rPr>
               <a:t>	</a:t>
             </a:r>
@@ -30290,10 +30277,10 @@
                 <a:solidFill>
                   <a:srgbClr val="FFFF66"/>
                 </a:solidFill>
-                <a:latin typeface="Cabin"/>
-                <a:ea typeface="Cabin"/>
-                <a:cs typeface="Cabin"/>
-                <a:sym typeface="Cabin"/>
+                <a:latin typeface="Gill Sans MT"/>
+                <a:ea typeface="Gill Sans MT"/>
+                <a:cs typeface="Gill Sans MT"/>
+                <a:sym typeface="Gill Sans MT"/>
               </a:rPr>
               <a:t>What would an NNI of 1 mean? </a:t>
             </a:r>
@@ -30311,10 +30298,10 @@
                 <a:solidFill>
                   <a:srgbClr val="FFFF66"/>
                 </a:solidFill>
-                <a:latin typeface="Cabin"/>
-                <a:ea typeface="Cabin"/>
-                <a:cs typeface="Cabin"/>
-                <a:sym typeface="Cabin"/>
+                <a:latin typeface="Gill Sans MT"/>
+                <a:ea typeface="Gill Sans MT"/>
+                <a:cs typeface="Gill Sans MT"/>
+                <a:sym typeface="Gill Sans MT"/>
               </a:rPr>
               <a:t>&gt;1? </a:t>
             </a:r>
@@ -30332,10 +30319,10 @@
                 <a:solidFill>
                   <a:srgbClr val="FFFF66"/>
                 </a:solidFill>
-                <a:latin typeface="Cabin"/>
-                <a:ea typeface="Cabin"/>
-                <a:cs typeface="Cabin"/>
-                <a:sym typeface="Cabin"/>
+                <a:latin typeface="Gill Sans MT"/>
+                <a:ea typeface="Gill Sans MT"/>
+                <a:cs typeface="Gill Sans MT"/>
+                <a:sym typeface="Gill Sans MT"/>
               </a:rPr>
               <a:t>&lt;1? </a:t>
             </a:r>
@@ -30406,10 +30393,10 @@
                 <a:solidFill>
                   <a:srgbClr val="FFFF66"/>
                 </a:solidFill>
-                <a:latin typeface="Cabin"/>
-                <a:ea typeface="Cabin"/>
-                <a:cs typeface="Cabin"/>
-                <a:sym typeface="Cabin"/>
+                <a:latin typeface="Gill Sans MT"/>
+                <a:ea typeface="Gill Sans MT"/>
+                <a:cs typeface="Gill Sans MT"/>
+                <a:sym typeface="Gill Sans MT"/>
               </a:rPr>
               <a:t>There’s also a significance test for NNI.</a:t>
             </a:r>
@@ -30427,10 +30414,10 @@
                 <a:solidFill>
                   <a:srgbClr val="FFFF66"/>
                 </a:solidFill>
-                <a:latin typeface="Cabin"/>
-                <a:ea typeface="Cabin"/>
-                <a:cs typeface="Cabin"/>
-                <a:sym typeface="Cabin"/>
+                <a:latin typeface="Gill Sans MT"/>
+                <a:ea typeface="Gill Sans MT"/>
+                <a:cs typeface="Gill Sans MT"/>
+                <a:sym typeface="Gill Sans MT"/>
               </a:rPr>
               <a:t>We won’t talk about it here.</a:t>
             </a:r>
@@ -30504,10 +30491,10 @@
                 <a:solidFill>
                   <a:srgbClr val="FFFF66"/>
                 </a:solidFill>
-                <a:latin typeface="Cabin"/>
-                <a:ea typeface="Cabin"/>
-                <a:cs typeface="Cabin"/>
-                <a:sym typeface="Cabin"/>
+                <a:latin typeface="Gill Sans MT"/>
+                <a:ea typeface="Gill Sans MT"/>
+                <a:cs typeface="Gill Sans MT"/>
+                <a:sym typeface="Gill Sans MT"/>
               </a:rPr>
               <a:t>Ripley’s K shows how results depend on scale</a:t>
             </a:r>
@@ -30551,10 +30538,10 @@
                 <a:solidFill>
                   <a:srgbClr val="FFFF66"/>
                 </a:solidFill>
-                <a:latin typeface="Cabin"/>
-                <a:ea typeface="Cabin"/>
-                <a:cs typeface="Cabin"/>
-                <a:sym typeface="Cabin"/>
+                <a:latin typeface="Gill Sans MT"/>
+                <a:ea typeface="Gill Sans MT"/>
+                <a:cs typeface="Gill Sans MT"/>
+                <a:sym typeface="Gill Sans MT"/>
               </a:rPr>
               <a:t>Measure number of neighbors at multiple scales and graph results</a:t>
             </a:r>

</xml_diff>